<commit_message>
popravio prezentaciju i primere
</commit_message>
<xml_diff>
--- a/predavanja/prezentacije/OOP08-Nizovi u Javi.pptx
+++ b/predavanja/prezentacije/OOP08-Nizovi u Javi.pptx
@@ -16278,16 +16278,25 @@
               <a:t>статички метод </a:t>
             </a:r>
             <a:r>
-              <a:rPr lang="en-US" sz="2000" dirty="0" err="1" smtClean="0">
+              <a:rPr lang="en-US" sz="2000" dirty="0" smtClean="0">
                 <a:solidFill>
                   <a:schemeClr val="tx1"/>
                 </a:solidFill>
                 <a:latin typeface="+mn-lt"/>
               </a:rPr>
-              <a:t>copyFrom</a:t>
-            </a:r>
-            <a:r>
-              <a:rPr lang="en-US" sz="2000" dirty="0" smtClean="0">
+              <a:t>copy</a:t>
+            </a:r>
+            <a:r>
+              <a:rPr lang="sr-Latn-RS" sz="2000" smtClean="0">
+                <a:solidFill>
+                  <a:schemeClr val="tx1"/>
+                </a:solidFill>
+                <a:latin typeface="+mn-lt"/>
+              </a:rPr>
+              <a:t>Of</a:t>
+            </a:r>
+            <a:r>
+              <a:rPr lang="en-US" sz="2000" smtClean="0">
                 <a:solidFill>
                   <a:schemeClr val="tx1"/>
                 </a:solidFill>
@@ -17345,16 +17354,7 @@
                 </a:solidFill>
                 <a:latin typeface="Garamond" pitchFamily="18" charset="0"/>
               </a:rPr>
-              <a:t>Овако дефинисан параметар функције мора да буде последњи у списку </a:t>
-            </a:r>
-            <a:r>
-              <a:rPr lang="sr-Cyrl-RS" dirty="0" smtClean="0">
-                <a:solidFill>
-                  <a:schemeClr val="tx1"/>
-                </a:solidFill>
-                <a:latin typeface="Garamond" pitchFamily="18" charset="0"/>
-              </a:rPr>
-              <a:t>параметара</a:t>
+              <a:t>Овако дефинисан параметар функције мора да буде последњи у списку параметара</a:t>
             </a:r>
             <a:endParaRPr lang="en-US" dirty="0" smtClean="0">
               <a:solidFill>

</xml_diff>